<commit_message>
added get_cred.py; added to readme
</commit_message>
<xml_diff>
--- a/Journal Analytics Process.pptx
+++ b/Journal Analytics Process.pptx
@@ -243,7 +243,7 @@
           <a:p>
             <a:fld id="{7C1D7149-9914-D746-A3F9-269AB628337D}" type="datetimeFigureOut">
               <a:rPr lang="en-US" smtClean="0"/>
-              <a:t>3/17/16</a:t>
+              <a:t>3/18/16</a:t>
             </a:fld>
             <a:endParaRPr lang="en-US"/>
           </a:p>
@@ -413,7 +413,7 @@
           <a:p>
             <a:fld id="{7C1D7149-9914-D746-A3F9-269AB628337D}" type="datetimeFigureOut">
               <a:rPr lang="en-US" smtClean="0"/>
-              <a:t>3/17/16</a:t>
+              <a:t>3/18/16</a:t>
             </a:fld>
             <a:endParaRPr lang="en-US"/>
           </a:p>
@@ -593,7 +593,7 @@
           <a:p>
             <a:fld id="{7C1D7149-9914-D746-A3F9-269AB628337D}" type="datetimeFigureOut">
               <a:rPr lang="en-US" smtClean="0"/>
-              <a:t>3/17/16</a:t>
+              <a:t>3/18/16</a:t>
             </a:fld>
             <a:endParaRPr lang="en-US"/>
           </a:p>
@@ -763,7 +763,7 @@
           <a:p>
             <a:fld id="{7C1D7149-9914-D746-A3F9-269AB628337D}" type="datetimeFigureOut">
               <a:rPr lang="en-US" smtClean="0"/>
-              <a:t>3/17/16</a:t>
+              <a:t>3/18/16</a:t>
             </a:fld>
             <a:endParaRPr lang="en-US"/>
           </a:p>
@@ -1009,7 +1009,7 @@
           <a:p>
             <a:fld id="{7C1D7149-9914-D746-A3F9-269AB628337D}" type="datetimeFigureOut">
               <a:rPr lang="en-US" smtClean="0"/>
-              <a:t>3/17/16</a:t>
+              <a:t>3/18/16</a:t>
             </a:fld>
             <a:endParaRPr lang="en-US"/>
           </a:p>
@@ -1241,7 +1241,7 @@
           <a:p>
             <a:fld id="{7C1D7149-9914-D746-A3F9-269AB628337D}" type="datetimeFigureOut">
               <a:rPr lang="en-US" smtClean="0"/>
-              <a:t>3/17/16</a:t>
+              <a:t>3/18/16</a:t>
             </a:fld>
             <a:endParaRPr lang="en-US"/>
           </a:p>
@@ -1608,7 +1608,7 @@
           <a:p>
             <a:fld id="{7C1D7149-9914-D746-A3F9-269AB628337D}" type="datetimeFigureOut">
               <a:rPr lang="en-US" smtClean="0"/>
-              <a:t>3/17/16</a:t>
+              <a:t>3/18/16</a:t>
             </a:fld>
             <a:endParaRPr lang="en-US"/>
           </a:p>
@@ -1726,7 +1726,7 @@
           <a:p>
             <a:fld id="{7C1D7149-9914-D746-A3F9-269AB628337D}" type="datetimeFigureOut">
               <a:rPr lang="en-US" smtClean="0"/>
-              <a:t>3/17/16</a:t>
+              <a:t>3/18/16</a:t>
             </a:fld>
             <a:endParaRPr lang="en-US"/>
           </a:p>
@@ -1821,7 +1821,7 @@
           <a:p>
             <a:fld id="{7C1D7149-9914-D746-A3F9-269AB628337D}" type="datetimeFigureOut">
               <a:rPr lang="en-US" smtClean="0"/>
-              <a:t>3/17/16</a:t>
+              <a:t>3/18/16</a:t>
             </a:fld>
             <a:endParaRPr lang="en-US"/>
           </a:p>
@@ -2098,7 +2098,7 @@
           <a:p>
             <a:fld id="{7C1D7149-9914-D746-A3F9-269AB628337D}" type="datetimeFigureOut">
               <a:rPr lang="en-US" smtClean="0"/>
-              <a:t>3/17/16</a:t>
+              <a:t>3/18/16</a:t>
             </a:fld>
             <a:endParaRPr lang="en-US"/>
           </a:p>
@@ -2351,7 +2351,7 @@
           <a:p>
             <a:fld id="{7C1D7149-9914-D746-A3F9-269AB628337D}" type="datetimeFigureOut">
               <a:rPr lang="en-US" smtClean="0"/>
-              <a:t>3/17/16</a:t>
+              <a:t>3/18/16</a:t>
             </a:fld>
             <a:endParaRPr lang="en-US"/>
           </a:p>
@@ -2564,7 +2564,7 @@
           <a:p>
             <a:fld id="{7C1D7149-9914-D746-A3F9-269AB628337D}" type="datetimeFigureOut">
               <a:rPr lang="en-US" smtClean="0"/>
-              <a:t>3/17/16</a:t>
+              <a:t>3/18/16</a:t>
             </a:fld>
             <a:endParaRPr lang="en-US"/>
           </a:p>
@@ -3500,7 +3500,7 @@
               </a:xfrm>
               <a:prstGeom prst="bentConnector3">
                 <a:avLst>
-                  <a:gd name="adj1" fmla="val 27256"/>
+                  <a:gd name="adj1" fmla="val 50000"/>
                 </a:avLst>
               </a:prstGeom>
               <a:ln>
@@ -3753,14 +3753,13 @@
               <p:cNvPr id="72" name="Elbow Connector 71"/>
               <p:cNvCxnSpPr>
                 <a:stCxn id="29" idx="3"/>
-                <a:endCxn id="19" idx="1"/>
               </p:cNvCxnSpPr>
               <p:nvPr/>
             </p:nvCxnSpPr>
             <p:spPr>
               <a:xfrm>
                 <a:off x="2796014" y="1116647"/>
-                <a:ext cx="678154" cy="702325"/>
+                <a:ext cx="678153" cy="566614"/>
               </a:xfrm>
               <a:prstGeom prst="bentConnector3">
                 <a:avLst>

</xml_diff>